<commit_message>
Updated 16S_ASV_Analysis.R, FCM_Analysis.R, Symbiodiniaceae_analysis.R, procrustes.R. Mostly for new visualizations and new stats in FCM_Analysis. Added new figures: 16S Stacked Bar Family Sig ASVs by DA v1.png 16S Stacked Bar Family Sig ASVs by DA v1.pptx 16S Stacked Bar Family Sig ASVs by DA.png 16S_metabolome_nmds_procrustes.jpeg 16S_tend_alpha_diversity.jpg ASV bubbleplot class v2 annotated.png ASV bubbleplot class v2 annotated.pptx ASV bubbleplot class v2.png Synthesis Figure.pptx sig.BA.and.BH.boxplot.jpeg sig.BA.boxplot.jpeg sig.BH.boxplot.jpeg sig.NbH.and.BA.and.BH.boxplot.jpeg sig.NbH.and.BA.boxplot.jpeg sig.NbH.and.BH.boxplot.jpeg sig.NbH.boxplot.jpeg Updated compiled figure folder: Figures - Sparagon and Arts et al.  x_2023.pptx
</commit_message>
<xml_diff>
--- a/figures/ASV bubbleplot class v2 annotated.pptx
+++ b/figures/ASV bubbleplot class v2 annotated.pptx
@@ -243,7 +243,7 @@
           <a:p>
             <a:fld id="{AF2D935F-D9F3-46D0-9E40-20744E0564D5}" type="datetimeFigureOut">
               <a:rPr lang="en-US" smtClean="0"/>
-              <a:t>6/10/2022</a:t>
+              <a:t>2/13/2023</a:t>
             </a:fld>
             <a:endParaRPr lang="en-US"/>
           </a:p>
@@ -413,7 +413,7 @@
           <a:p>
             <a:fld id="{AF2D935F-D9F3-46D0-9E40-20744E0564D5}" type="datetimeFigureOut">
               <a:rPr lang="en-US" smtClean="0"/>
-              <a:t>6/10/2022</a:t>
+              <a:t>2/13/2023</a:t>
             </a:fld>
             <a:endParaRPr lang="en-US"/>
           </a:p>
@@ -593,7 +593,7 @@
           <a:p>
             <a:fld id="{AF2D935F-D9F3-46D0-9E40-20744E0564D5}" type="datetimeFigureOut">
               <a:rPr lang="en-US" smtClean="0"/>
-              <a:t>6/10/2022</a:t>
+              <a:t>2/13/2023</a:t>
             </a:fld>
             <a:endParaRPr lang="en-US"/>
           </a:p>
@@ -763,7 +763,7 @@
           <a:p>
             <a:fld id="{AF2D935F-D9F3-46D0-9E40-20744E0564D5}" type="datetimeFigureOut">
               <a:rPr lang="en-US" smtClean="0"/>
-              <a:t>6/10/2022</a:t>
+              <a:t>2/13/2023</a:t>
             </a:fld>
             <a:endParaRPr lang="en-US"/>
           </a:p>
@@ -1007,7 +1007,7 @@
           <a:p>
             <a:fld id="{AF2D935F-D9F3-46D0-9E40-20744E0564D5}" type="datetimeFigureOut">
               <a:rPr lang="en-US" smtClean="0"/>
-              <a:t>6/10/2022</a:t>
+              <a:t>2/13/2023</a:t>
             </a:fld>
             <a:endParaRPr lang="en-US"/>
           </a:p>
@@ -1239,7 +1239,7 @@
           <a:p>
             <a:fld id="{AF2D935F-D9F3-46D0-9E40-20744E0564D5}" type="datetimeFigureOut">
               <a:rPr lang="en-US" smtClean="0"/>
-              <a:t>6/10/2022</a:t>
+              <a:t>2/13/2023</a:t>
             </a:fld>
             <a:endParaRPr lang="en-US"/>
           </a:p>
@@ -1606,7 +1606,7 @@
           <a:p>
             <a:fld id="{AF2D935F-D9F3-46D0-9E40-20744E0564D5}" type="datetimeFigureOut">
               <a:rPr lang="en-US" smtClean="0"/>
-              <a:t>6/10/2022</a:t>
+              <a:t>2/13/2023</a:t>
             </a:fld>
             <a:endParaRPr lang="en-US"/>
           </a:p>
@@ -1724,7 +1724,7 @@
           <a:p>
             <a:fld id="{AF2D935F-D9F3-46D0-9E40-20744E0564D5}" type="datetimeFigureOut">
               <a:rPr lang="en-US" smtClean="0"/>
-              <a:t>6/10/2022</a:t>
+              <a:t>2/13/2023</a:t>
             </a:fld>
             <a:endParaRPr lang="en-US"/>
           </a:p>
@@ -1819,7 +1819,7 @@
           <a:p>
             <a:fld id="{AF2D935F-D9F3-46D0-9E40-20744E0564D5}" type="datetimeFigureOut">
               <a:rPr lang="en-US" smtClean="0"/>
-              <a:t>6/10/2022</a:t>
+              <a:t>2/13/2023</a:t>
             </a:fld>
             <a:endParaRPr lang="en-US"/>
           </a:p>
@@ -2096,7 +2096,7 @@
           <a:p>
             <a:fld id="{AF2D935F-D9F3-46D0-9E40-20744E0564D5}" type="datetimeFigureOut">
               <a:rPr lang="en-US" smtClean="0"/>
-              <a:t>6/10/2022</a:t>
+              <a:t>2/13/2023</a:t>
             </a:fld>
             <a:endParaRPr lang="en-US"/>
           </a:p>
@@ -2353,7 +2353,7 @@
           <a:p>
             <a:fld id="{AF2D935F-D9F3-46D0-9E40-20744E0564D5}" type="datetimeFigureOut">
               <a:rPr lang="en-US" smtClean="0"/>
-              <a:t>6/10/2022</a:t>
+              <a:t>2/13/2023</a:t>
             </a:fld>
             <a:endParaRPr lang="en-US"/>
           </a:p>
@@ -2566,7 +2566,7 @@
           <a:p>
             <a:fld id="{AF2D935F-D9F3-46D0-9E40-20744E0564D5}" type="datetimeFigureOut">
               <a:rPr lang="en-US" smtClean="0"/>
-              <a:t>6/10/2022</a:t>
+              <a:t>2/13/2023</a:t>
             </a:fld>
             <a:endParaRPr lang="en-US"/>
           </a:p>
@@ -2985,7 +2985,7 @@
           </p:cNvPicPr>
           <p:nvPr/>
         </p:nvPicPr>
-        <p:blipFill>
+        <p:blipFill rotWithShape="1">
           <a:blip r:embed="rId2">
             <a:extLst>
               <a:ext uri="{28A0092B-C50C-407E-A947-70E740481C1C}">
@@ -2993,14 +2993,13 @@
               </a:ext>
             </a:extLst>
           </a:blip>
-          <a:stretch>
-            <a:fillRect/>
-          </a:stretch>
+          <a:srcRect b="1311"/>
+          <a:stretch/>
         </p:blipFill>
         <p:spPr>
           <a:xfrm>
             <a:off x="0" y="0"/>
-            <a:ext cx="27432000" cy="24819428"/>
+            <a:ext cx="27432000" cy="24494248"/>
           </a:xfrm>
           <a:prstGeom prst="rect">
             <a:avLst/>
@@ -4255,6 +4254,111 @@
           </a:p>
         </p:txBody>
       </p:sp>
+      <p:pic>
+        <p:nvPicPr>
+          <p:cNvPr id="5" name="Picture 4" descr="Table&#10;&#10;Description automatically generated">
+            <a:extLst>
+              <a:ext uri="{FF2B5EF4-FFF2-40B4-BE49-F238E27FC236}">
+                <a16:creationId xmlns:a16="http://schemas.microsoft.com/office/drawing/2014/main" id="{EA4A6989-25B5-89B3-CCAA-850C22FB21BB}"/>
+              </a:ext>
+            </a:extLst>
+          </p:cNvPr>
+          <p:cNvPicPr>
+            <a:picLocks noChangeAspect="1"/>
+          </p:cNvPicPr>
+          <p:nvPr/>
+        </p:nvPicPr>
+        <p:blipFill rotWithShape="1">
+          <a:blip r:embed="rId3">
+            <a:extLst>
+              <a:ext uri="{28A0092B-C50C-407E-A947-70E740481C1C}">
+                <a14:useLocalDpi xmlns:a14="http://schemas.microsoft.com/office/drawing/2010/main" val="0"/>
+              </a:ext>
+            </a:extLst>
+          </a:blip>
+          <a:srcRect l="22817" t="90112" r="69541"/>
+          <a:stretch/>
+        </p:blipFill>
+        <p:spPr>
+          <a:xfrm>
+            <a:off x="6133038" y="21841432"/>
+            <a:ext cx="2265947" cy="2652816"/>
+          </a:xfrm>
+          <a:prstGeom prst="rect">
+            <a:avLst/>
+          </a:prstGeom>
+        </p:spPr>
+      </p:pic>
+      <p:pic>
+        <p:nvPicPr>
+          <p:cNvPr id="6" name="Picture 5" descr="Table&#10;&#10;Description automatically generated">
+            <a:extLst>
+              <a:ext uri="{FF2B5EF4-FFF2-40B4-BE49-F238E27FC236}">
+                <a16:creationId xmlns:a16="http://schemas.microsoft.com/office/drawing/2014/main" id="{DF4FBC7D-9B0F-B0E1-4EF0-109B7F443421}"/>
+              </a:ext>
+            </a:extLst>
+          </p:cNvPr>
+          <p:cNvPicPr>
+            <a:picLocks noChangeAspect="1"/>
+          </p:cNvPicPr>
+          <p:nvPr/>
+        </p:nvPicPr>
+        <p:blipFill rotWithShape="1">
+          <a:blip r:embed="rId3">
+            <a:extLst>
+              <a:ext uri="{28A0092B-C50C-407E-A947-70E740481C1C}">
+                <a14:useLocalDpi xmlns:a14="http://schemas.microsoft.com/office/drawing/2010/main" val="0"/>
+              </a:ext>
+            </a:extLst>
+          </a:blip>
+          <a:srcRect l="22817" t="90112" r="69541"/>
+          <a:stretch/>
+        </p:blipFill>
+        <p:spPr>
+          <a:xfrm>
+            <a:off x="14723470" y="21841432"/>
+            <a:ext cx="2265947" cy="2652816"/>
+          </a:xfrm>
+          <a:prstGeom prst="rect">
+            <a:avLst/>
+          </a:prstGeom>
+        </p:spPr>
+      </p:pic>
+      <p:pic>
+        <p:nvPicPr>
+          <p:cNvPr id="7" name="Picture 6" descr="Table&#10;&#10;Description automatically generated">
+            <a:extLst>
+              <a:ext uri="{FF2B5EF4-FFF2-40B4-BE49-F238E27FC236}">
+                <a16:creationId xmlns:a16="http://schemas.microsoft.com/office/drawing/2014/main" id="{8E506291-F548-7141-8E8B-BDE7A945D8DB}"/>
+              </a:ext>
+            </a:extLst>
+          </p:cNvPr>
+          <p:cNvPicPr>
+            <a:picLocks noChangeAspect="1"/>
+          </p:cNvPicPr>
+          <p:nvPr/>
+        </p:nvPicPr>
+        <p:blipFill rotWithShape="1">
+          <a:blip r:embed="rId3">
+            <a:extLst>
+              <a:ext uri="{28A0092B-C50C-407E-A947-70E740481C1C}">
+                <a14:useLocalDpi xmlns:a14="http://schemas.microsoft.com/office/drawing/2010/main" val="0"/>
+              </a:ext>
+            </a:extLst>
+          </a:blip>
+          <a:srcRect l="22817" t="90112" r="69541"/>
+          <a:stretch/>
+        </p:blipFill>
+        <p:spPr>
+          <a:xfrm>
+            <a:off x="22884193" y="21841432"/>
+            <a:ext cx="2265947" cy="2652816"/>
+          </a:xfrm>
+          <a:prstGeom prst="rect">
+            <a:avLst/>
+          </a:prstGeom>
+        </p:spPr>
+      </p:pic>
     </p:spTree>
     <p:extLst>
       <p:ext uri="{BB962C8B-B14F-4D97-AF65-F5344CB8AC3E}">

</xml_diff>